<commit_message>
Added Cat quote in Project. Added felloship + AXA XL briefings in Outputs.
</commit_message>
<xml_diff>
--- a/Zaid_quote.pptx
+++ b/Zaid_quote.pptx
@@ -243,7 +243,7 @@
           <a:p>
             <a:fld id="{6F7ABC96-69A9-4EB5-9269-01A57CAA9BCF}" type="datetimeFigureOut">
               <a:rPr lang="en-GB" smtClean="0"/>
-              <a:t>08/10/2020</a:t>
+              <a:t>21/10/2020</a:t>
             </a:fld>
             <a:endParaRPr lang="en-GB"/>
           </a:p>
@@ -413,7 +413,7 @@
           <a:p>
             <a:fld id="{6F7ABC96-69A9-4EB5-9269-01A57CAA9BCF}" type="datetimeFigureOut">
               <a:rPr lang="en-GB" smtClean="0"/>
-              <a:t>08/10/2020</a:t>
+              <a:t>21/10/2020</a:t>
             </a:fld>
             <a:endParaRPr lang="en-GB"/>
           </a:p>
@@ -593,7 +593,7 @@
           <a:p>
             <a:fld id="{6F7ABC96-69A9-4EB5-9269-01A57CAA9BCF}" type="datetimeFigureOut">
               <a:rPr lang="en-GB" smtClean="0"/>
-              <a:t>08/10/2020</a:t>
+              <a:t>21/10/2020</a:t>
             </a:fld>
             <a:endParaRPr lang="en-GB"/>
           </a:p>
@@ -763,7 +763,7 @@
           <a:p>
             <a:fld id="{6F7ABC96-69A9-4EB5-9269-01A57CAA9BCF}" type="datetimeFigureOut">
               <a:rPr lang="en-GB" smtClean="0"/>
-              <a:t>08/10/2020</a:t>
+              <a:t>21/10/2020</a:t>
             </a:fld>
             <a:endParaRPr lang="en-GB"/>
           </a:p>
@@ -1007,7 +1007,7 @@
           <a:p>
             <a:fld id="{6F7ABC96-69A9-4EB5-9269-01A57CAA9BCF}" type="datetimeFigureOut">
               <a:rPr lang="en-GB" smtClean="0"/>
-              <a:t>08/10/2020</a:t>
+              <a:t>21/10/2020</a:t>
             </a:fld>
             <a:endParaRPr lang="en-GB"/>
           </a:p>
@@ -1239,7 +1239,7 @@
           <a:p>
             <a:fld id="{6F7ABC96-69A9-4EB5-9269-01A57CAA9BCF}" type="datetimeFigureOut">
               <a:rPr lang="en-GB" smtClean="0"/>
-              <a:t>08/10/2020</a:t>
+              <a:t>21/10/2020</a:t>
             </a:fld>
             <a:endParaRPr lang="en-GB"/>
           </a:p>
@@ -1606,7 +1606,7 @@
           <a:p>
             <a:fld id="{6F7ABC96-69A9-4EB5-9269-01A57CAA9BCF}" type="datetimeFigureOut">
               <a:rPr lang="en-GB" smtClean="0"/>
-              <a:t>08/10/2020</a:t>
+              <a:t>21/10/2020</a:t>
             </a:fld>
             <a:endParaRPr lang="en-GB"/>
           </a:p>
@@ -1724,7 +1724,7 @@
           <a:p>
             <a:fld id="{6F7ABC96-69A9-4EB5-9269-01A57CAA9BCF}" type="datetimeFigureOut">
               <a:rPr lang="en-GB" smtClean="0"/>
-              <a:t>08/10/2020</a:t>
+              <a:t>21/10/2020</a:t>
             </a:fld>
             <a:endParaRPr lang="en-GB"/>
           </a:p>
@@ -1819,7 +1819,7 @@
           <a:p>
             <a:fld id="{6F7ABC96-69A9-4EB5-9269-01A57CAA9BCF}" type="datetimeFigureOut">
               <a:rPr lang="en-GB" smtClean="0"/>
-              <a:t>08/10/2020</a:t>
+              <a:t>21/10/2020</a:t>
             </a:fld>
             <a:endParaRPr lang="en-GB"/>
           </a:p>
@@ -2096,7 +2096,7 @@
           <a:p>
             <a:fld id="{6F7ABC96-69A9-4EB5-9269-01A57CAA9BCF}" type="datetimeFigureOut">
               <a:rPr lang="en-GB" smtClean="0"/>
-              <a:t>08/10/2020</a:t>
+              <a:t>21/10/2020</a:t>
             </a:fld>
             <a:endParaRPr lang="en-GB"/>
           </a:p>
@@ -2353,7 +2353,7 @@
           <a:p>
             <a:fld id="{6F7ABC96-69A9-4EB5-9269-01A57CAA9BCF}" type="datetimeFigureOut">
               <a:rPr lang="en-GB" smtClean="0"/>
-              <a:t>08/10/2020</a:t>
+              <a:t>21/10/2020</a:t>
             </a:fld>
             <a:endParaRPr lang="en-GB"/>
           </a:p>
@@ -2566,7 +2566,7 @@
           <a:p>
             <a:fld id="{6F7ABC96-69A9-4EB5-9269-01A57CAA9BCF}" type="datetimeFigureOut">
               <a:rPr lang="en-GB" smtClean="0"/>
-              <a:t>08/10/2020</a:t>
+              <a:t>21/10/2020</a:t>
             </a:fld>
             <a:endParaRPr lang="en-GB"/>
           </a:p>
@@ -3061,17 +3061,7 @@
                 <a:ea typeface="Calibri" panose="020F0502020204030204" pitchFamily="34" charset="0"/>
                 <a:cs typeface="Times New Roman" panose="02020603050405020304" pitchFamily="18" charset="0"/>
               </a:rPr>
-              <a:t> has shed light on the potential to focus the pricing actuaries time on validating and refining the most influential assumptions in any individual case and also to efficiently highlight the models sensitivity to certain </a:t>
-            </a:r>
-            <a:r>
-              <a:rPr lang="en-GB" sz="1500" i="1">
-                <a:solidFill>
-                  <a:srgbClr val="0070C0"/>
-                </a:solidFill>
-                <a:ea typeface="Calibri" panose="020F0502020204030204" pitchFamily="34" charset="0"/>
-                <a:cs typeface="Times New Roman" panose="02020603050405020304" pitchFamily="18" charset="0"/>
-              </a:rPr>
-              <a:t>assumptions.</a:t>
+              <a:t> has shed light on the potential to focus the pricing actuaries time on validating and refining the most influential assumptions in any individual case and also to efficiently highlight the models sensitivity to certain assumptions.</a:t>
             </a:r>
           </a:p>
           <a:p>
@@ -3084,16 +3074,6 @@
               </a:spcAft>
             </a:pPr>
             <a:r>
-              <a:rPr lang="en-GB" sz="1500" i="1">
-                <a:solidFill>
-                  <a:srgbClr val="0070C0"/>
-                </a:solidFill>
-                <a:ea typeface="Calibri" panose="020F0502020204030204" pitchFamily="34" charset="0"/>
-                <a:cs typeface="Times New Roman" panose="02020603050405020304" pitchFamily="18" charset="0"/>
-              </a:rPr>
-              <a:t> </a:t>
-            </a:r>
-            <a:r>
               <a:rPr lang="en-GB" sz="1500" i="1" dirty="0">
                 <a:solidFill>
                   <a:srgbClr val="0070C0"/>
@@ -3101,7 +3081,7 @@
                 <a:ea typeface="Calibri" panose="020F0502020204030204" pitchFamily="34" charset="0"/>
                 <a:cs typeface="Times New Roman" panose="02020603050405020304" pitchFamily="18" charset="0"/>
               </a:rPr>
-              <a:t>The efficiency gains and improved credibility would be extremely valuable to the business.”</a:t>
+              <a:t> The efficiency gains and improved credibility would be extremely valuable to the business.”</a:t>
             </a:r>
           </a:p>
           <a:p>
@@ -3136,7 +3116,7 @@
                 <a:ea typeface="Calibri" panose="020F0502020204030204" pitchFamily="34" charset="0"/>
                 <a:cs typeface="Times New Roman" panose="02020603050405020304" pitchFamily="18" charset="0"/>
               </a:rPr>
-              <a:t>Zaid </a:t>
+              <a:t>             Zaid </a:t>
             </a:r>
             <a:r>
               <a:rPr lang="en-GB" sz="1500" i="1" dirty="0" err="1">
@@ -3156,7 +3136,7 @@
                 <a:ea typeface="Calibri" panose="020F0502020204030204" pitchFamily="34" charset="0"/>
                 <a:cs typeface="Times New Roman" panose="02020603050405020304" pitchFamily="18" charset="0"/>
               </a:rPr>
-              <a:t> (previously at XL Catlin)</a:t>
+              <a:t> (Senior Pricing Analyst at XL Catlin)</a:t>
             </a:r>
             <a:r>
               <a:rPr lang="it-IT" sz="1500" dirty="0">

</xml_diff>